<commit_message>
Moving vignettes to online-only-doc to reduce the size of the package
</commit_message>
<xml_diff>
--- a/inst/specialVignettes/adherer_with_databases.pptx
+++ b/inst/specialVignettes/adherer_with_databases.pptx
@@ -208,7 +208,7 @@
           <a:p>
             <a:fld id="{D49F7DCE-ED50-2F46-88E1-09A2579EDFA6}" type="datetimeFigureOut">
               <a:rPr lang="en-GB" smtClean="0"/>
-              <a:t>11/11/2018</a:t>
+              <a:t>10/02/2019</a:t>
             </a:fld>
             <a:endParaRPr lang="en-GB"/>
           </a:p>
@@ -709,7 +709,7 @@
           <a:p>
             <a:fld id="{D81E82A4-3F5E-3A4F-9A3E-53B5E113E6D4}" type="datetimeFigureOut">
               <a:rPr lang="en-GB" smtClean="0"/>
-              <a:t>11/11/2018</a:t>
+              <a:t>10/02/2019</a:t>
             </a:fld>
             <a:endParaRPr lang="en-GB"/>
           </a:p>
@@ -909,7 +909,7 @@
           <a:p>
             <a:fld id="{D81E82A4-3F5E-3A4F-9A3E-53B5E113E6D4}" type="datetimeFigureOut">
               <a:rPr lang="en-GB" smtClean="0"/>
-              <a:t>11/11/2018</a:t>
+              <a:t>10/02/2019</a:t>
             </a:fld>
             <a:endParaRPr lang="en-GB"/>
           </a:p>
@@ -1119,7 +1119,7 @@
           <a:p>
             <a:fld id="{D81E82A4-3F5E-3A4F-9A3E-53B5E113E6D4}" type="datetimeFigureOut">
               <a:rPr lang="en-GB" smtClean="0"/>
-              <a:t>11/11/2018</a:t>
+              <a:t>10/02/2019</a:t>
             </a:fld>
             <a:endParaRPr lang="en-GB"/>
           </a:p>
@@ -1319,7 +1319,7 @@
           <a:p>
             <a:fld id="{D81E82A4-3F5E-3A4F-9A3E-53B5E113E6D4}" type="datetimeFigureOut">
               <a:rPr lang="en-GB" smtClean="0"/>
-              <a:t>11/11/2018</a:t>
+              <a:t>10/02/2019</a:t>
             </a:fld>
             <a:endParaRPr lang="en-GB"/>
           </a:p>
@@ -1595,7 +1595,7 @@
           <a:p>
             <a:fld id="{D81E82A4-3F5E-3A4F-9A3E-53B5E113E6D4}" type="datetimeFigureOut">
               <a:rPr lang="en-GB" smtClean="0"/>
-              <a:t>11/11/2018</a:t>
+              <a:t>10/02/2019</a:t>
             </a:fld>
             <a:endParaRPr lang="en-GB"/>
           </a:p>
@@ -1863,7 +1863,7 @@
           <a:p>
             <a:fld id="{D81E82A4-3F5E-3A4F-9A3E-53B5E113E6D4}" type="datetimeFigureOut">
               <a:rPr lang="en-GB" smtClean="0"/>
-              <a:t>11/11/2018</a:t>
+              <a:t>10/02/2019</a:t>
             </a:fld>
             <a:endParaRPr lang="en-GB"/>
           </a:p>
@@ -2278,7 +2278,7 @@
           <a:p>
             <a:fld id="{D81E82A4-3F5E-3A4F-9A3E-53B5E113E6D4}" type="datetimeFigureOut">
               <a:rPr lang="en-GB" smtClean="0"/>
-              <a:t>11/11/2018</a:t>
+              <a:t>10/02/2019</a:t>
             </a:fld>
             <a:endParaRPr lang="en-GB"/>
           </a:p>
@@ -2420,7 +2420,7 @@
           <a:p>
             <a:fld id="{D81E82A4-3F5E-3A4F-9A3E-53B5E113E6D4}" type="datetimeFigureOut">
               <a:rPr lang="en-GB" smtClean="0"/>
-              <a:t>11/11/2018</a:t>
+              <a:t>10/02/2019</a:t>
             </a:fld>
             <a:endParaRPr lang="en-GB"/>
           </a:p>
@@ -2533,7 +2533,7 @@
           <a:p>
             <a:fld id="{D81E82A4-3F5E-3A4F-9A3E-53B5E113E6D4}" type="datetimeFigureOut">
               <a:rPr lang="en-GB" smtClean="0"/>
-              <a:t>11/11/2018</a:t>
+              <a:t>10/02/2019</a:t>
             </a:fld>
             <a:endParaRPr lang="en-GB"/>
           </a:p>
@@ -2846,7 +2846,7 @@
           <a:p>
             <a:fld id="{D81E82A4-3F5E-3A4F-9A3E-53B5E113E6D4}" type="datetimeFigureOut">
               <a:rPr lang="en-GB" smtClean="0"/>
-              <a:t>11/11/2018</a:t>
+              <a:t>10/02/2019</a:t>
             </a:fld>
             <a:endParaRPr lang="en-GB"/>
           </a:p>
@@ -3135,7 +3135,7 @@
           <a:p>
             <a:fld id="{D81E82A4-3F5E-3A4F-9A3E-53B5E113E6D4}" type="datetimeFigureOut">
               <a:rPr lang="en-GB" smtClean="0"/>
-              <a:t>11/11/2018</a:t>
+              <a:t>10/02/2019</a:t>
             </a:fld>
             <a:endParaRPr lang="en-GB"/>
           </a:p>
@@ -3378,7 +3378,7 @@
           <a:p>
             <a:fld id="{D81E82A4-3F5E-3A4F-9A3E-53B5E113E6D4}" type="datetimeFigureOut">
               <a:rPr lang="en-GB" smtClean="0"/>
-              <a:t>11/11/2018</a:t>
+              <a:t>10/02/2019</a:t>
             </a:fld>
             <a:endParaRPr lang="en-GB"/>
           </a:p>
@@ -3890,116 +3890,6 @@
           </a:p>
         </p:txBody>
       </p:sp>
-      <p:grpSp>
-        <p:nvGrpSpPr>
-          <p:cNvPr id="4" name="Group 3">
-            <a:extLst>
-              <a:ext uri="{FF2B5EF4-FFF2-40B4-BE49-F238E27FC236}">
-                <a16:creationId xmlns:a16="http://schemas.microsoft.com/office/drawing/2014/main" id="{1EFBA060-D559-D644-BA1B-E8B333545FC8}"/>
-              </a:ext>
-            </a:extLst>
-          </p:cNvPr>
-          <p:cNvGrpSpPr/>
-          <p:nvPr/>
-        </p:nvGrpSpPr>
-        <p:grpSpPr>
-          <a:xfrm>
-            <a:off x="809121" y="3189377"/>
-            <a:ext cx="1777317" cy="628178"/>
-            <a:chOff x="945266" y="2664368"/>
-            <a:chExt cx="1777317" cy="628178"/>
-          </a:xfrm>
-        </p:grpSpPr>
-        <p:pic>
-          <p:nvPicPr>
-            <p:cNvPr id="1026" name="Picture 2" descr="Image result for R logo">
-              <a:extLst>
-                <a:ext uri="{FF2B5EF4-FFF2-40B4-BE49-F238E27FC236}">
-                  <a16:creationId xmlns:a16="http://schemas.microsoft.com/office/drawing/2014/main" id="{BD044586-2EDC-B846-8C44-07A19DC30654}"/>
-                </a:ext>
-              </a:extLst>
-            </p:cNvPr>
-            <p:cNvPicPr>
-              <a:picLocks noChangeAspect="1" noChangeArrowheads="1"/>
-            </p:cNvPicPr>
-            <p:nvPr/>
-          </p:nvPicPr>
-          <p:blipFill>
-            <a:blip r:embed="rId4">
-              <a:extLst>
-                <a:ext uri="{28A0092B-C50C-407E-A947-70E740481C1C}">
-                  <a14:useLocalDpi xmlns:a14="http://schemas.microsoft.com/office/drawing/2010/main" val="0"/>
-                </a:ext>
-              </a:extLst>
-            </a:blip>
-            <a:srcRect/>
-            <a:stretch>
-              <a:fillRect/>
-            </a:stretch>
-          </p:blipFill>
-          <p:spPr bwMode="auto">
-            <a:xfrm>
-              <a:off x="2081892" y="2664368"/>
-              <a:ext cx="640691" cy="497478"/>
-            </a:xfrm>
-            <a:prstGeom prst="rect">
-              <a:avLst/>
-            </a:prstGeom>
-            <a:noFill/>
-            <a:extLst>
-              <a:ext uri="{909E8E84-426E-40DD-AFC4-6F175D3DCCD1}">
-                <a14:hiddenFill xmlns:a14="http://schemas.microsoft.com/office/drawing/2010/main">
-                  <a:solidFill>
-                    <a:srgbClr val="FFFFFF"/>
-                  </a:solidFill>
-                </a14:hiddenFill>
-              </a:ext>
-            </a:extLst>
-          </p:spPr>
-        </p:pic>
-        <p:sp>
-          <p:nvSpPr>
-            <p:cNvPr id="3" name="TextBox 2">
-              <a:extLst>
-                <a:ext uri="{FF2B5EF4-FFF2-40B4-BE49-F238E27FC236}">
-                  <a16:creationId xmlns:a16="http://schemas.microsoft.com/office/drawing/2014/main" id="{D004AC8F-0D61-0443-9460-ED6E05698AB7}"/>
-                </a:ext>
-              </a:extLst>
-            </p:cNvPr>
-            <p:cNvSpPr txBox="1"/>
-            <p:nvPr/>
-          </p:nvSpPr>
-          <p:spPr>
-            <a:xfrm>
-              <a:off x="945266" y="2769326"/>
-              <a:ext cx="1483098" cy="523220"/>
-            </a:xfrm>
-            <a:prstGeom prst="rect">
-              <a:avLst/>
-            </a:prstGeom>
-            <a:noFill/>
-          </p:spPr>
-          <p:txBody>
-            <a:bodyPr wrap="none" rtlCol="0">
-              <a:spAutoFit/>
-            </a:bodyPr>
-            <a:lstStyle/>
-            <a:p>
-              <a:r>
-                <a:rPr lang="en-GB" sz="2800" b="1" dirty="0">
-                  <a:solidFill>
-                    <a:srgbClr val="0066B3"/>
-                  </a:solidFill>
-                  <a:latin typeface="DejaVu Sans Mono Book" panose="020B0609030804020204" pitchFamily="49" charset="0"/>
-                  <a:ea typeface="DejaVu Sans Mono Book" panose="020B0609030804020204" pitchFamily="49" charset="0"/>
-                  <a:cs typeface="DejaVu Sans Mono Book" panose="020B0609030804020204" pitchFamily="49" charset="0"/>
-                </a:rPr>
-                <a:t>Adhere</a:t>
-              </a:r>
-            </a:p>
-          </p:txBody>
-        </p:sp>
-      </p:grpSp>
       <p:pic>
         <p:nvPicPr>
           <p:cNvPr id="1030" name="Picture 6" descr="Image result for database logo">
@@ -4015,7 +3905,7 @@
           <p:nvPr/>
         </p:nvPicPr>
         <p:blipFill>
-          <a:blip r:embed="rId5">
+          <a:blip r:embed="rId4">
             <a:extLst>
               <a:ext uri="{28A0092B-C50C-407E-A947-70E740481C1C}">
                 <a14:useLocalDpi xmlns:a14="http://schemas.microsoft.com/office/drawing/2010/main" val="0"/>
@@ -4062,7 +3952,7 @@
           <p:nvPr/>
         </p:nvPicPr>
         <p:blipFill>
-          <a:blip r:embed="rId5">
+          <a:blip r:embed="rId4">
             <a:extLst>
               <a:ext uri="{28A0092B-C50C-407E-A947-70E740481C1C}">
                 <a14:useLocalDpi xmlns:a14="http://schemas.microsoft.com/office/drawing/2010/main" val="0"/>
@@ -4109,7 +3999,7 @@
           <p:nvPr/>
         </p:nvPicPr>
         <p:blipFill>
-          <a:blip r:embed="rId6">
+          <a:blip r:embed="rId5">
             <a:extLst>
               <a:ext uri="{28A0092B-C50C-407E-A947-70E740481C1C}">
                 <a14:useLocalDpi xmlns:a14="http://schemas.microsoft.com/office/drawing/2010/main" val="0"/>
@@ -4227,7 +4117,7 @@
           <p:nvPr/>
         </p:nvPicPr>
         <p:blipFill>
-          <a:blip r:embed="rId7">
+          <a:blip r:embed="rId6">
             <a:extLst>
               <a:ext uri="{28A0092B-C50C-407E-A947-70E740481C1C}">
                 <a14:useLocalDpi xmlns:a14="http://schemas.microsoft.com/office/drawing/2010/main" val="0"/>
@@ -4274,7 +4164,7 @@
           <p:nvPr/>
         </p:nvPicPr>
         <p:blipFill>
-          <a:blip r:embed="rId8">
+          <a:blip r:embed="rId7">
             <a:extLst>
               <a:ext uri="{28A0092B-C50C-407E-A947-70E740481C1C}">
                 <a14:useLocalDpi xmlns:a14="http://schemas.microsoft.com/office/drawing/2010/main" val="0"/>
@@ -4321,7 +4211,7 @@
           <p:nvPr/>
         </p:nvPicPr>
         <p:blipFill>
-          <a:blip r:embed="rId9">
+          <a:blip r:embed="rId8">
             <a:extLst>
               <a:ext uri="{28A0092B-C50C-407E-A947-70E740481C1C}">
                 <a14:useLocalDpi xmlns:a14="http://schemas.microsoft.com/office/drawing/2010/main" val="0"/>
@@ -4368,7 +4258,7 @@
           <p:nvPr/>
         </p:nvPicPr>
         <p:blipFill>
-          <a:blip r:embed="rId10">
+          <a:blip r:embed="rId9">
             <a:extLst>
               <a:ext uri="{28A0092B-C50C-407E-A947-70E740481C1C}">
                 <a14:useLocalDpi xmlns:a14="http://schemas.microsoft.com/office/drawing/2010/main" val="0"/>
@@ -4751,7 +4641,7 @@
           <p:nvPr/>
         </p:nvPicPr>
         <p:blipFill>
-          <a:blip r:embed="rId11">
+          <a:blip r:embed="rId10">
             <a:extLst>
               <a:ext uri="{28A0092B-C50C-407E-A947-70E740481C1C}">
                 <a14:useLocalDpi xmlns:a14="http://schemas.microsoft.com/office/drawing/2010/main" val="0"/>
@@ -4996,6 +4886,36 @@
           </a:p>
         </p:txBody>
       </p:sp>
+      <p:pic>
+        <p:nvPicPr>
+          <p:cNvPr id="6" name="Picture 5">
+            <a:extLst>
+              <a:ext uri="{FF2B5EF4-FFF2-40B4-BE49-F238E27FC236}">
+                <a16:creationId xmlns:a16="http://schemas.microsoft.com/office/drawing/2014/main" id="{627D8D3F-4C3B-3C46-8986-16600FBF0A95}"/>
+              </a:ext>
+            </a:extLst>
+          </p:cNvPr>
+          <p:cNvPicPr>
+            <a:picLocks noChangeAspect="1"/>
+          </p:cNvPicPr>
+          <p:nvPr/>
+        </p:nvPicPr>
+        <p:blipFill>
+          <a:blip r:embed="rId11"/>
+          <a:stretch>
+            <a:fillRect/>
+          </a:stretch>
+        </p:blipFill>
+        <p:spPr>
+          <a:xfrm>
+            <a:off x="755259" y="3172740"/>
+            <a:ext cx="1843823" cy="512520"/>
+          </a:xfrm>
+          <a:prstGeom prst="rect">
+            <a:avLst/>
+          </a:prstGeom>
+        </p:spPr>
+      </p:pic>
     </p:spTree>
     <p:extLst>
       <p:ext uri="{BB962C8B-B14F-4D97-AF65-F5344CB8AC3E}">

</xml_diff>